<commit_message>
#1 - discussion work
- absolute to apparent magnitude, physics wrong
- worked on dicussion of snoopy, building and expanding on how we can judge the quality of fit that it produces
- bleugh
</commit_message>
<xml_diff>
--- a/laboratory_project/report/intro/typeia.pptx
+++ b/laboratory_project/report/intro/typeia.pptx
@@ -107,6 +107,11 @@
       </a:defRPr>
     </a:lvl9pPr>
   </p:defaultTextStyle>
+  <p:extLst>
+    <p:ext uri="{EFAFB233-063F-42B5-8137-9DF3F51BA10A}">
+      <p15:sldGuideLst xmlns:p15="http://schemas.microsoft.com/office/powerpoint/2012/main"/>
+    </p:ext>
+  </p:extLst>
 </p:presentation>
 </file>
 
@@ -192,7 +197,7 @@
           <a:p>
             <a:fld id="{A560DB95-4507-FA4F-80F3-8A9AECA775A8}" type="datetimeFigureOut">
               <a:rPr lang="en-GB" smtClean="0"/>
-              <a:t>27/12/2017</a:t>
+              <a:t>03/01/2018</a:t>
             </a:fld>
             <a:endParaRPr lang="en-GB"/>
           </a:p>
@@ -675,7 +680,7 @@
           <a:p>
             <a:fld id="{79183C37-99C2-3747-A608-DD2CE687B023}" type="datetimeFigureOut">
               <a:rPr lang="en-GB" smtClean="0"/>
-              <a:t>27/12/2017</a:t>
+              <a:t>03/01/2018</a:t>
             </a:fld>
             <a:endParaRPr lang="en-GB"/>
           </a:p>
@@ -845,7 +850,7 @@
           <a:p>
             <a:fld id="{79183C37-99C2-3747-A608-DD2CE687B023}" type="datetimeFigureOut">
               <a:rPr lang="en-GB" smtClean="0"/>
-              <a:t>27/12/2017</a:t>
+              <a:t>03/01/2018</a:t>
             </a:fld>
             <a:endParaRPr lang="en-GB"/>
           </a:p>
@@ -1025,7 +1030,7 @@
           <a:p>
             <a:fld id="{79183C37-99C2-3747-A608-DD2CE687B023}" type="datetimeFigureOut">
               <a:rPr lang="en-GB" smtClean="0"/>
-              <a:t>27/12/2017</a:t>
+              <a:t>03/01/2018</a:t>
             </a:fld>
             <a:endParaRPr lang="en-GB"/>
           </a:p>
@@ -1195,7 +1200,7 @@
           <a:p>
             <a:fld id="{79183C37-99C2-3747-A608-DD2CE687B023}" type="datetimeFigureOut">
               <a:rPr lang="en-GB" smtClean="0"/>
-              <a:t>27/12/2017</a:t>
+              <a:t>03/01/2018</a:t>
             </a:fld>
             <a:endParaRPr lang="en-GB"/>
           </a:p>
@@ -1441,7 +1446,7 @@
           <a:p>
             <a:fld id="{79183C37-99C2-3747-A608-DD2CE687B023}" type="datetimeFigureOut">
               <a:rPr lang="en-GB" smtClean="0"/>
-              <a:t>27/12/2017</a:t>
+              <a:t>03/01/2018</a:t>
             </a:fld>
             <a:endParaRPr lang="en-GB"/>
           </a:p>
@@ -1673,7 +1678,7 @@
           <a:p>
             <a:fld id="{79183C37-99C2-3747-A608-DD2CE687B023}" type="datetimeFigureOut">
               <a:rPr lang="en-GB" smtClean="0"/>
-              <a:t>27/12/2017</a:t>
+              <a:t>03/01/2018</a:t>
             </a:fld>
             <a:endParaRPr lang="en-GB"/>
           </a:p>
@@ -2040,7 +2045,7 @@
           <a:p>
             <a:fld id="{79183C37-99C2-3747-A608-DD2CE687B023}" type="datetimeFigureOut">
               <a:rPr lang="en-GB" smtClean="0"/>
-              <a:t>27/12/2017</a:t>
+              <a:t>03/01/2018</a:t>
             </a:fld>
             <a:endParaRPr lang="en-GB"/>
           </a:p>
@@ -2158,7 +2163,7 @@
           <a:p>
             <a:fld id="{79183C37-99C2-3747-A608-DD2CE687B023}" type="datetimeFigureOut">
               <a:rPr lang="en-GB" smtClean="0"/>
-              <a:t>27/12/2017</a:t>
+              <a:t>03/01/2018</a:t>
             </a:fld>
             <a:endParaRPr lang="en-GB"/>
           </a:p>
@@ -2253,7 +2258,7 @@
           <a:p>
             <a:fld id="{79183C37-99C2-3747-A608-DD2CE687B023}" type="datetimeFigureOut">
               <a:rPr lang="en-GB" smtClean="0"/>
-              <a:t>27/12/2017</a:t>
+              <a:t>03/01/2018</a:t>
             </a:fld>
             <a:endParaRPr lang="en-GB"/>
           </a:p>
@@ -2530,7 +2535,7 @@
           <a:p>
             <a:fld id="{79183C37-99C2-3747-A608-DD2CE687B023}" type="datetimeFigureOut">
               <a:rPr lang="en-GB" smtClean="0"/>
-              <a:t>27/12/2017</a:t>
+              <a:t>03/01/2018</a:t>
             </a:fld>
             <a:endParaRPr lang="en-GB"/>
           </a:p>
@@ -2783,7 +2788,7 @@
           <a:p>
             <a:fld id="{79183C37-99C2-3747-A608-DD2CE687B023}" type="datetimeFigureOut">
               <a:rPr lang="en-GB" smtClean="0"/>
-              <a:t>27/12/2017</a:t>
+              <a:t>03/01/2018</a:t>
             </a:fld>
             <a:endParaRPr lang="en-GB"/>
           </a:p>
@@ -2996,7 +3001,7 @@
           <a:p>
             <a:fld id="{79183C37-99C2-3747-A608-DD2CE687B023}" type="datetimeFigureOut">
               <a:rPr lang="en-GB" smtClean="0"/>
-              <a:t>27/12/2017</a:t>
+              <a:t>03/01/2018</a:t>
             </a:fld>
             <a:endParaRPr lang="en-GB"/>
           </a:p>
@@ -3403,21 +3408,21 @@
       </p:grpSpPr>
       <p:grpSp>
         <p:nvGrpSpPr>
-          <p:cNvPr id="8" name="Group 7"/>
+          <p:cNvPr id="4" name="Group 3"/>
           <p:cNvGrpSpPr/>
           <p:nvPr/>
         </p:nvGrpSpPr>
         <p:grpSpPr>
           <a:xfrm>
-            <a:off x="3168453" y="1321586"/>
-            <a:ext cx="5854700" cy="4048334"/>
-            <a:chOff x="3152873" y="1397000"/>
-            <a:chExt cx="5854700" cy="4048334"/>
+            <a:off x="3526672" y="972794"/>
+            <a:ext cx="5854700" cy="4040146"/>
+            <a:chOff x="3441830" y="1349866"/>
+            <a:chExt cx="5854700" cy="4040146"/>
           </a:xfrm>
         </p:grpSpPr>
         <p:pic>
           <p:nvPicPr>
-            <p:cNvPr id="7" name="Picture 6"/>
+            <p:cNvPr id="2" name="Picture 1"/>
             <p:cNvPicPr>
               <a:picLocks noChangeAspect="1"/>
             </p:cNvPicPr>
@@ -3425,20 +3430,19 @@
           </p:nvPicPr>
           <p:blipFill rotWithShape="1">
             <a:blip r:embed="rId3">
-              <a:alphaModFix/>
               <a:extLst>
                 <a:ext uri="{28A0092B-C50C-407E-A947-70E740481C1C}">
                   <a14:useLocalDpi xmlns:a14="http://schemas.microsoft.com/office/drawing/2010/main" val="0"/>
                 </a:ext>
               </a:extLst>
             </a:blip>
-            <a:srcRect t="7871"/>
+            <a:srcRect t="8243" b="-186"/>
             <a:stretch/>
           </p:blipFill>
           <p:spPr>
             <a:xfrm>
-              <a:off x="3152873" y="1397000"/>
-              <a:ext cx="5854700" cy="4048334"/>
+              <a:off x="3441830" y="1349866"/>
+              <a:ext cx="5854700" cy="4040146"/>
             </a:xfrm>
             <a:prstGeom prst="rect">
               <a:avLst/>
@@ -3453,7 +3457,7 @@
           </p:nvSpPr>
           <p:spPr>
             <a:xfrm>
-              <a:off x="7360436" y="4235967"/>
+              <a:off x="7649393" y="4188833"/>
               <a:ext cx="567508" cy="338554"/>
             </a:xfrm>
             <a:prstGeom prst="rect">
@@ -3490,7 +3494,7 @@
           </p:nvSpPr>
           <p:spPr>
             <a:xfrm>
-              <a:off x="7360436" y="3240046"/>
+              <a:off x="7649393" y="3192912"/>
               <a:ext cx="567508" cy="338554"/>
             </a:xfrm>
             <a:prstGeom prst="rect">

</xml_diff>

<commit_message>
#1 - proofreading and editing stuff
</commit_message>
<xml_diff>
--- a/laboratory_project/report/intro/typeia.pptx
+++ b/laboratory_project/report/intro/typeia.pptx
@@ -197,7 +197,7 @@
           <a:p>
             <a:fld id="{A560DB95-4507-FA4F-80F3-8A9AECA775A8}" type="datetimeFigureOut">
               <a:rPr lang="en-GB" smtClean="0"/>
-              <a:t>03/01/2018</a:t>
+              <a:t>09/01/2018</a:t>
             </a:fld>
             <a:endParaRPr lang="en-GB"/>
           </a:p>
@@ -680,7 +680,7 @@
           <a:p>
             <a:fld id="{79183C37-99C2-3747-A608-DD2CE687B023}" type="datetimeFigureOut">
               <a:rPr lang="en-GB" smtClean="0"/>
-              <a:t>03/01/2018</a:t>
+              <a:t>09/01/2018</a:t>
             </a:fld>
             <a:endParaRPr lang="en-GB"/>
           </a:p>
@@ -850,7 +850,7 @@
           <a:p>
             <a:fld id="{79183C37-99C2-3747-A608-DD2CE687B023}" type="datetimeFigureOut">
               <a:rPr lang="en-GB" smtClean="0"/>
-              <a:t>03/01/2018</a:t>
+              <a:t>09/01/2018</a:t>
             </a:fld>
             <a:endParaRPr lang="en-GB"/>
           </a:p>
@@ -1030,7 +1030,7 @@
           <a:p>
             <a:fld id="{79183C37-99C2-3747-A608-DD2CE687B023}" type="datetimeFigureOut">
               <a:rPr lang="en-GB" smtClean="0"/>
-              <a:t>03/01/2018</a:t>
+              <a:t>09/01/2018</a:t>
             </a:fld>
             <a:endParaRPr lang="en-GB"/>
           </a:p>
@@ -1200,7 +1200,7 @@
           <a:p>
             <a:fld id="{79183C37-99C2-3747-A608-DD2CE687B023}" type="datetimeFigureOut">
               <a:rPr lang="en-GB" smtClean="0"/>
-              <a:t>03/01/2018</a:t>
+              <a:t>09/01/2018</a:t>
             </a:fld>
             <a:endParaRPr lang="en-GB"/>
           </a:p>
@@ -1446,7 +1446,7 @@
           <a:p>
             <a:fld id="{79183C37-99C2-3747-A608-DD2CE687B023}" type="datetimeFigureOut">
               <a:rPr lang="en-GB" smtClean="0"/>
-              <a:t>03/01/2018</a:t>
+              <a:t>09/01/2018</a:t>
             </a:fld>
             <a:endParaRPr lang="en-GB"/>
           </a:p>
@@ -1678,7 +1678,7 @@
           <a:p>
             <a:fld id="{79183C37-99C2-3747-A608-DD2CE687B023}" type="datetimeFigureOut">
               <a:rPr lang="en-GB" smtClean="0"/>
-              <a:t>03/01/2018</a:t>
+              <a:t>09/01/2018</a:t>
             </a:fld>
             <a:endParaRPr lang="en-GB"/>
           </a:p>
@@ -2045,7 +2045,7 @@
           <a:p>
             <a:fld id="{79183C37-99C2-3747-A608-DD2CE687B023}" type="datetimeFigureOut">
               <a:rPr lang="en-GB" smtClean="0"/>
-              <a:t>03/01/2018</a:t>
+              <a:t>09/01/2018</a:t>
             </a:fld>
             <a:endParaRPr lang="en-GB"/>
           </a:p>
@@ -2163,7 +2163,7 @@
           <a:p>
             <a:fld id="{79183C37-99C2-3747-A608-DD2CE687B023}" type="datetimeFigureOut">
               <a:rPr lang="en-GB" smtClean="0"/>
-              <a:t>03/01/2018</a:t>
+              <a:t>09/01/2018</a:t>
             </a:fld>
             <a:endParaRPr lang="en-GB"/>
           </a:p>
@@ -2258,7 +2258,7 @@
           <a:p>
             <a:fld id="{79183C37-99C2-3747-A608-DD2CE687B023}" type="datetimeFigureOut">
               <a:rPr lang="en-GB" smtClean="0"/>
-              <a:t>03/01/2018</a:t>
+              <a:t>09/01/2018</a:t>
             </a:fld>
             <a:endParaRPr lang="en-GB"/>
           </a:p>
@@ -2535,7 +2535,7 @@
           <a:p>
             <a:fld id="{79183C37-99C2-3747-A608-DD2CE687B023}" type="datetimeFigureOut">
               <a:rPr lang="en-GB" smtClean="0"/>
-              <a:t>03/01/2018</a:t>
+              <a:t>09/01/2018</a:t>
             </a:fld>
             <a:endParaRPr lang="en-GB"/>
           </a:p>
@@ -2788,7 +2788,7 @@
           <a:p>
             <a:fld id="{79183C37-99C2-3747-A608-DD2CE687B023}" type="datetimeFigureOut">
               <a:rPr lang="en-GB" smtClean="0"/>
-              <a:t>03/01/2018</a:t>
+              <a:t>09/01/2018</a:t>
             </a:fld>
             <a:endParaRPr lang="en-GB"/>
           </a:p>
@@ -3001,7 +3001,7 @@
           <a:p>
             <a:fld id="{79183C37-99C2-3747-A608-DD2CE687B023}" type="datetimeFigureOut">
               <a:rPr lang="en-GB" smtClean="0"/>
-              <a:t>03/01/2018</a:t>
+              <a:t>09/01/2018</a:t>
             </a:fld>
             <a:endParaRPr lang="en-GB"/>
           </a:p>
@@ -3457,13 +3457,17 @@
           </p:nvSpPr>
           <p:spPr>
             <a:xfrm>
-              <a:off x="7649393" y="4188833"/>
-              <a:ext cx="567508" cy="338554"/>
+              <a:off x="7614763" y="4198260"/>
+              <a:ext cx="636767" cy="338554"/>
             </a:xfrm>
             <a:prstGeom prst="rect">
               <a:avLst/>
             </a:prstGeom>
-            <a:noFill/>
+            <a:solidFill>
+              <a:schemeClr val="bg1">
+                <a:alpha val="75000"/>
+              </a:schemeClr>
+            </a:solidFill>
             <a:ln>
               <a:noFill/>
             </a:ln>
@@ -3481,8 +3485,13 @@
                   <a:ea typeface="CMU Serif Extra BoldNonextended" charset="0"/>
                   <a:cs typeface="CMU Serif Extra BoldNonextended" charset="0"/>
                 </a:rPr>
-                <a:t>B-3</a:t>
+                <a:t>B+3</a:t>
               </a:r>
+              <a:endParaRPr lang="en-GB" sz="1600" b="1" dirty="0" smtClean="0">
+                <a:latin typeface="CMU Serif Extra BoldNonextended" charset="0"/>
+                <a:ea typeface="CMU Serif Extra BoldNonextended" charset="0"/>
+                <a:cs typeface="CMU Serif Extra BoldNonextended" charset="0"/>
+              </a:endParaRPr>
             </a:p>
           </p:txBody>
         </p:sp>

</xml_diff>